<commit_message>
Made slight clarifications to project docs
</commit_message>
<xml_diff>
--- a/week-6/Overview of Tandem.pptx
+++ b/week-6/Overview of Tandem.pptx
@@ -212,7 +212,7 @@
           <a:p>
             <a:fld id="{6ADEFA60-6B18-43F1-BF0B-8A26D4658119}" type="datetimeFigureOut">
               <a:rPr lang="en-US" smtClean="0"/>
-              <a:t>10/25/2023</a:t>
+              <a:t>10/26/2023</a:t>
             </a:fld>
             <a:endParaRPr lang="en-US"/>
           </a:p>
@@ -1364,7 +1364,7 @@
           <a:p>
             <a:fld id="{C43A76A3-ADC8-4477-8FC1-B9DD55D84908}" type="datetime1">
               <a:rPr lang="en-US" smtClean="0"/>
-              <a:t>10/25/2023</a:t>
+              <a:t>10/26/2023</a:t>
             </a:fld>
             <a:endParaRPr lang="en-US" dirty="0"/>
           </a:p>
@@ -1562,7 +1562,7 @@
           <a:p>
             <a:fld id="{D6762538-DC4D-4667-96E5-B3278DDF8B12}" type="datetime1">
               <a:rPr lang="en-US" smtClean="0"/>
-              <a:t>10/25/2023</a:t>
+              <a:t>10/26/2023</a:t>
             </a:fld>
             <a:endParaRPr lang="en-US"/>
           </a:p>
@@ -1770,7 +1770,7 @@
           <a:p>
             <a:fld id="{05880548-5C08-4BE3-B63E-F2BB63B0B00C}" type="datetime1">
               <a:rPr lang="en-US" smtClean="0"/>
-              <a:t>10/25/2023</a:t>
+              <a:t>10/26/2023</a:t>
             </a:fld>
             <a:endParaRPr lang="en-US"/>
           </a:p>
@@ -1968,7 +1968,7 @@
           <a:p>
             <a:fld id="{DE7F49BE-398D-479A-8A7E-5DDBCA61EDCB}" type="datetime1">
               <a:rPr lang="en-US" smtClean="0"/>
-              <a:t>10/25/2023</a:t>
+              <a:t>10/26/2023</a:t>
             </a:fld>
             <a:endParaRPr lang="en-US"/>
           </a:p>
@@ -2244,7 +2244,7 @@
           <a:p>
             <a:fld id="{CCD0C193-4974-4A1F-9C63-07D595E30D66}" type="datetime1">
               <a:rPr lang="en-US" smtClean="0"/>
-              <a:t>10/25/2023</a:t>
+              <a:t>10/26/2023</a:t>
             </a:fld>
             <a:endParaRPr lang="en-US"/>
           </a:p>
@@ -2511,7 +2511,7 @@
           <a:p>
             <a:fld id="{701AA87F-28D4-4BF0-B81F-877A89DFD5AC}" type="datetime1">
               <a:rPr lang="en-US" smtClean="0"/>
-              <a:t>10/25/2023</a:t>
+              <a:t>10/26/2023</a:t>
             </a:fld>
             <a:endParaRPr lang="en-US"/>
           </a:p>
@@ -2925,7 +2925,7 @@
           <a:p>
             <a:fld id="{A8A9F1F3-208B-49A3-B337-9C8ACEB3E0E1}" type="datetime1">
               <a:rPr lang="en-US" smtClean="0"/>
-              <a:t>10/25/2023</a:t>
+              <a:t>10/26/2023</a:t>
             </a:fld>
             <a:endParaRPr lang="en-US"/>
           </a:p>
@@ -3072,7 +3072,7 @@
           <a:p>
             <a:fld id="{27AF6CA6-7293-4AA2-A0E0-A3BF4416E786}" type="datetime1">
               <a:rPr lang="en-US" smtClean="0"/>
-              <a:t>10/25/2023</a:t>
+              <a:t>10/26/2023</a:t>
             </a:fld>
             <a:endParaRPr lang="en-US"/>
           </a:p>
@@ -3185,7 +3185,7 @@
           <a:p>
             <a:fld id="{98D87016-7BCD-46FB-8EE3-AB6C369108B4}" type="datetime1">
               <a:rPr lang="en-US" smtClean="0"/>
-              <a:t>10/25/2023</a:t>
+              <a:t>10/26/2023</a:t>
             </a:fld>
             <a:endParaRPr lang="en-US"/>
           </a:p>
@@ -3504,7 +3504,7 @@
           <a:p>
             <a:fld id="{A1547011-1FFC-4EF8-9A2E-53B4AD2ADBD4}" type="datetime1">
               <a:rPr lang="en-US" smtClean="0"/>
-              <a:t>10/25/2023</a:t>
+              <a:t>10/26/2023</a:t>
             </a:fld>
             <a:endParaRPr lang="en-US"/>
           </a:p>
@@ -3799,7 +3799,7 @@
           <a:p>
             <a:fld id="{9562EB47-45B4-4EF5-A743-B4885DD2F060}" type="datetime1">
               <a:rPr lang="en-US" smtClean="0"/>
-              <a:t>10/25/2023</a:t>
+              <a:t>10/26/2023</a:t>
             </a:fld>
             <a:endParaRPr lang="en-US"/>
           </a:p>
@@ -5184,7 +5184,7 @@
           <a:p>
             <a:fld id="{4A8D24A4-5FEC-4062-8995-EB21925B3B40}" type="datetime1">
               <a:rPr lang="en-US" smtClean="0"/>
-              <a:t>10/25/2023</a:t>
+              <a:t>10/26/2023</a:t>
             </a:fld>
             <a:endParaRPr lang="en-US" sz="1000" dirty="0"/>
           </a:p>

</xml_diff>